<commit_message>
correction margin and everything else
</commit_message>
<xml_diff>
--- a/P2.pptx
+++ b/P2.pptx
@@ -12,7 +12,8 @@
     <p:sldId id="260" r:id="rId6"/>
     <p:sldId id="261" r:id="rId7"/>
     <p:sldId id="262" r:id="rId8"/>
-    <p:sldId id="263" r:id="rId9"/>
+    <p:sldId id="264" r:id="rId9"/>
+    <p:sldId id="263" r:id="rId10"/>
   </p:sldIdLst>
   <p:sldSz cx="12192000" cy="6858000"/>
   <p:notesSz cx="6858000" cy="9144000"/>
@@ -6501,7 +6502,7 @@
               <a:buAutoNum type="arabicPeriod"/>
             </a:pPr>
             <a:r>
-              <a:rPr lang="fr-FR" sz="2400"/>
+              <a:rPr lang="fr-FR" sz="2400" dirty="0"/>
               <a:t>Contexte du Projet</a:t>
             </a:r>
           </a:p>
@@ -6511,7 +6512,7 @@
               <a:buAutoNum type="arabicPeriod"/>
             </a:pPr>
             <a:r>
-              <a:rPr lang="fr-FR" sz="2400"/>
+              <a:rPr lang="fr-FR" sz="2400" dirty="0"/>
               <a:t>Rendu Visuel Desktop</a:t>
             </a:r>
           </a:p>
@@ -6521,7 +6522,7 @@
               <a:buAutoNum type="arabicPeriod"/>
             </a:pPr>
             <a:r>
-              <a:rPr lang="fr-FR" sz="2400"/>
+              <a:rPr lang="fr-FR" sz="2400" dirty="0"/>
               <a:t>Rendu Visuel Tablette</a:t>
             </a:r>
           </a:p>
@@ -6531,7 +6532,7 @@
               <a:buAutoNum type="arabicPeriod"/>
             </a:pPr>
             <a:r>
-              <a:rPr lang="fr-FR" sz="2400"/>
+              <a:rPr lang="fr-FR" sz="2400" dirty="0"/>
               <a:t>Rendu Visuel Mobile</a:t>
             </a:r>
           </a:p>
@@ -6541,7 +6542,7 @@
               <a:buAutoNum type="arabicPeriod"/>
             </a:pPr>
             <a:r>
-              <a:rPr lang="fr-FR" sz="2400"/>
+              <a:rPr lang="fr-FR" sz="2400" dirty="0"/>
               <a:t>Code du projet</a:t>
             </a:r>
           </a:p>
@@ -6551,7 +6552,17 @@
               <a:buAutoNum type="arabicPeriod"/>
             </a:pPr>
             <a:r>
-              <a:rPr lang="fr-FR" sz="2400"/>
+              <a:rPr lang="fr-FR" sz="2400" dirty="0"/>
+              <a:t>Vérification W3 HTML / CSS</a:t>
+            </a:r>
+          </a:p>
+          <a:p>
+            <a:pPr marL="514350" indent="-514350">
+              <a:buFont typeface="+mj-lt"/>
+              <a:buAutoNum type="arabicPeriod"/>
+            </a:pPr>
+            <a:r>
+              <a:rPr lang="fr-FR" sz="2400" dirty="0"/>
               <a:t>Bilan</a:t>
             </a:r>
           </a:p>
@@ -6922,6 +6933,331 @@
 <file path=ppt/slides/slide5.xml><?xml version="1.0" encoding="utf-8"?>
 <p:sld xmlns:a="http://schemas.openxmlformats.org/drawingml/2006/main" xmlns:r="http://schemas.openxmlformats.org/officeDocument/2006/relationships" xmlns:p="http://schemas.openxmlformats.org/presentationml/2006/main">
   <p:cSld>
+    <p:bg>
+      <p:bgPr>
+        <a:solidFill>
+          <a:schemeClr val="bg1">
+            <a:tint val="95000"/>
+            <a:satMod val="170000"/>
+          </a:schemeClr>
+        </a:solidFill>
+        <a:effectLst/>
+      </p:bgPr>
+    </p:bg>
+    <p:spTree>
+      <p:nvGrpSpPr>
+        <p:cNvPr id="1" name=""/>
+        <p:cNvGrpSpPr/>
+        <p:nvPr/>
+      </p:nvGrpSpPr>
+      <p:grpSpPr>
+        <a:xfrm>
+          <a:off x="0" y="0"/>
+          <a:ext cx="0" cy="0"/>
+          <a:chOff x="0" y="0"/>
+          <a:chExt cx="0" cy="0"/>
+        </a:xfrm>
+      </p:grpSpPr>
+      <p:sp useBgFill="1">
+        <p:nvSpPr>
+          <p:cNvPr id="9" name="Rectangle 8">
+            <a:extLst>
+              <a:ext uri="{FF2B5EF4-FFF2-40B4-BE49-F238E27FC236}">
+                <a16:creationId xmlns:a16="http://schemas.microsoft.com/office/drawing/2014/main" id="{8537B233-9CDD-4A90-AABB-A8963DEE4FBC}"/>
+              </a:ext>
+              <a:ext uri="{C183D7F6-B498-43B3-948B-1728B52AA6E4}">
+                <adec:decorative xmlns:adec="http://schemas.microsoft.com/office/drawing/2017/decorative" val="1"/>
+              </a:ext>
+            </a:extLst>
+          </p:cNvPr>
+          <p:cNvSpPr>
+            <a:spLocks noGrp="1" noRot="1" noChangeAspect="1" noMove="1" noResize="1" noEditPoints="1" noAdjustHandles="1" noChangeArrowheads="1" noChangeShapeType="1" noTextEdit="1"/>
+          </p:cNvSpPr>
+          <p:nvPr>
+            <p:extLst>
+              <p:ext uri="{386F3935-93C4-4BCD-93E2-E3B085C9AB24}">
+                <p16:designElem xmlns:p16="http://schemas.microsoft.com/office/powerpoint/2015/main" val="1"/>
+              </p:ext>
+            </p:extLst>
+          </p:nvPr>
+        </p:nvSpPr>
+        <p:spPr>
+          <a:xfrm>
+            <a:off x="0" y="1"/>
+            <a:ext cx="12192000" cy="6858000"/>
+          </a:xfrm>
+          <a:prstGeom prst="rect">
+            <a:avLst/>
+          </a:prstGeom>
+          <a:ln>
+            <a:noFill/>
+          </a:ln>
+        </p:spPr>
+        <p:style>
+          <a:lnRef idx="2">
+            <a:schemeClr val="accent1">
+              <a:shade val="50000"/>
+            </a:schemeClr>
+          </a:lnRef>
+          <a:fillRef idx="1">
+            <a:schemeClr val="accent1"/>
+          </a:fillRef>
+          <a:effectRef idx="0">
+            <a:schemeClr val="accent1"/>
+          </a:effectRef>
+          <a:fontRef idx="minor">
+            <a:schemeClr val="lt1"/>
+          </a:fontRef>
+        </p:style>
+        <p:txBody>
+          <a:bodyPr rtlCol="0" anchor="ctr"/>
+          <a:lstStyle/>
+          <a:p>
+            <a:pPr marL="0" marR="0" lvl="0" indent="0" algn="ctr" defTabSz="914400" rtl="0" eaLnBrk="1" fontAlgn="auto" latinLnBrk="0" hangingPunct="1">
+              <a:lnSpc>
+                <a:spcPct val="100000"/>
+              </a:lnSpc>
+              <a:spcBef>
+                <a:spcPts val="0"/>
+              </a:spcBef>
+              <a:spcAft>
+                <a:spcPts val="0"/>
+              </a:spcAft>
+              <a:buClrTx/>
+              <a:buSzTx/>
+              <a:buFontTx/>
+              <a:buNone/>
+              <a:tabLst/>
+              <a:defRPr/>
+            </a:pPr>
+            <a:endParaRPr kumimoji="0" lang="en-US" sz="1800" b="0" i="0" u="none" strike="noStrike" kern="1200" cap="none" spc="0" normalizeH="0" baseline="0" noProof="0">
+              <a:ln>
+                <a:noFill/>
+              </a:ln>
+              <a:solidFill>
+                <a:prstClr val="white"/>
+              </a:solidFill>
+              <a:effectLst/>
+              <a:uLnTx/>
+              <a:uFillTx/>
+              <a:latin typeface="Tw Cen MT" panose="020B0602020104020603"/>
+              <a:ea typeface="+mn-ea"/>
+              <a:cs typeface="+mn-cs"/>
+            </a:endParaRPr>
+          </a:p>
+        </p:txBody>
+      </p:sp>
+      <p:sp>
+        <p:nvSpPr>
+          <p:cNvPr id="2" name="Titre 1">
+            <a:extLst>
+              <a:ext uri="{FF2B5EF4-FFF2-40B4-BE49-F238E27FC236}">
+                <a16:creationId xmlns:a16="http://schemas.microsoft.com/office/drawing/2014/main" id="{6D3CF20D-1F62-981C-18CF-871354947664}"/>
+              </a:ext>
+            </a:extLst>
+          </p:cNvPr>
+          <p:cNvSpPr>
+            <a:spLocks noGrp="1"/>
+          </p:cNvSpPr>
+          <p:nvPr>
+            <p:ph type="title"/>
+          </p:nvPr>
+        </p:nvSpPr>
+        <p:spPr>
+          <a:xfrm>
+            <a:off x="6751180" y="895369"/>
+            <a:ext cx="4724530" cy="2975876"/>
+          </a:xfrm>
+        </p:spPr>
+        <p:txBody>
+          <a:bodyPr vert="horz" lIns="91440" tIns="45720" rIns="91440" bIns="45720" rtlCol="0" anchor="b">
+            <a:normAutofit/>
+          </a:bodyPr>
+          <a:lstStyle/>
+          <a:p>
+            <a:r>
+              <a:rPr lang="en-US" sz="6000" kern="1200" dirty="0">
+                <a:solidFill>
+                  <a:schemeClr val="tx1"/>
+                </a:solidFill>
+                <a:latin typeface="+mj-lt"/>
+                <a:ea typeface="+mj-ea"/>
+                <a:cs typeface="+mj-cs"/>
+              </a:rPr>
+              <a:t>3. </a:t>
+            </a:r>
+            <a:r>
+              <a:rPr lang="en-US" sz="6000" kern="1200" dirty="0" err="1">
+                <a:solidFill>
+                  <a:schemeClr val="tx1"/>
+                </a:solidFill>
+                <a:latin typeface="+mj-lt"/>
+                <a:ea typeface="+mj-ea"/>
+                <a:cs typeface="+mj-cs"/>
+              </a:rPr>
+              <a:t>Rendu</a:t>
+            </a:r>
+            <a:r>
+              <a:rPr lang="en-US" sz="6000" kern="1200" dirty="0">
+                <a:solidFill>
+                  <a:schemeClr val="tx1"/>
+                </a:solidFill>
+                <a:latin typeface="+mj-lt"/>
+                <a:ea typeface="+mj-ea"/>
+                <a:cs typeface="+mj-cs"/>
+              </a:rPr>
+              <a:t> </a:t>
+            </a:r>
+            <a:r>
+              <a:rPr lang="en-US" sz="6000" kern="1200" dirty="0" err="1">
+                <a:solidFill>
+                  <a:schemeClr val="tx1"/>
+                </a:solidFill>
+                <a:latin typeface="+mj-lt"/>
+                <a:ea typeface="+mj-ea"/>
+                <a:cs typeface="+mj-cs"/>
+              </a:rPr>
+              <a:t>Visuel</a:t>
+            </a:r>
+            <a:r>
+              <a:rPr lang="en-US" sz="6000" kern="1200" dirty="0">
+                <a:solidFill>
+                  <a:schemeClr val="tx1"/>
+                </a:solidFill>
+                <a:latin typeface="+mj-lt"/>
+                <a:ea typeface="+mj-ea"/>
+                <a:cs typeface="+mj-cs"/>
+              </a:rPr>
+              <a:t> </a:t>
+            </a:r>
+            <a:r>
+              <a:rPr lang="en-US" sz="6000" kern="1200" dirty="0" err="1">
+                <a:solidFill>
+                  <a:schemeClr val="tx1"/>
+                </a:solidFill>
+                <a:latin typeface="+mj-lt"/>
+                <a:ea typeface="+mj-ea"/>
+                <a:cs typeface="+mj-cs"/>
+              </a:rPr>
+              <a:t>Tablette</a:t>
+            </a:r>
+            <a:endParaRPr lang="en-US" sz="6000" kern="1200" dirty="0">
+              <a:solidFill>
+                <a:schemeClr val="tx1"/>
+              </a:solidFill>
+              <a:latin typeface="+mj-lt"/>
+              <a:ea typeface="+mj-ea"/>
+              <a:cs typeface="+mj-cs"/>
+            </a:endParaRPr>
+          </a:p>
+        </p:txBody>
+      </p:sp>
+      <p:pic>
+        <p:nvPicPr>
+          <p:cNvPr id="4" name="Image 3">
+            <a:extLst>
+              <a:ext uri="{FF2B5EF4-FFF2-40B4-BE49-F238E27FC236}">
+                <a16:creationId xmlns:a16="http://schemas.microsoft.com/office/drawing/2014/main" id="{8A88CFB0-F9FD-0331-2A97-8802149A295F}"/>
+              </a:ext>
+            </a:extLst>
+          </p:cNvPr>
+          <p:cNvPicPr>
+            <a:picLocks noChangeAspect="1"/>
+          </p:cNvPicPr>
+          <p:nvPr/>
+        </p:nvPicPr>
+        <p:blipFill>
+          <a:blip r:embed="rId2"/>
+          <a:stretch>
+            <a:fillRect/>
+          </a:stretch>
+        </p:blipFill>
+        <p:spPr>
+          <a:xfrm>
+            <a:off x="1022739" y="566916"/>
+            <a:ext cx="4464851" cy="5724168"/>
+          </a:xfrm>
+          <a:prstGeom prst="rect">
+            <a:avLst/>
+          </a:prstGeom>
+        </p:spPr>
+      </p:pic>
+      <p:cxnSp>
+        <p:nvCxnSpPr>
+          <p:cNvPr id="11" name="Straight Connector 10">
+            <a:extLst>
+              <a:ext uri="{FF2B5EF4-FFF2-40B4-BE49-F238E27FC236}">
+                <a16:creationId xmlns:a16="http://schemas.microsoft.com/office/drawing/2014/main" id="{040575EE-C594-4566-BC00-663004E52AB5}"/>
+              </a:ext>
+              <a:ext uri="{C183D7F6-B498-43B3-948B-1728B52AA6E4}">
+                <adec:decorative xmlns:adec="http://schemas.microsoft.com/office/drawing/2017/decorative" val="1"/>
+              </a:ext>
+            </a:extLst>
+          </p:cNvPr>
+          <p:cNvCxnSpPr>
+            <a:cxnSpLocks noGrp="1" noRot="1" noChangeAspect="1" noMove="1" noResize="1" noEditPoints="1" noAdjustHandles="1" noChangeArrowheads="1" noChangeShapeType="1"/>
+          </p:cNvCxnSpPr>
+          <p:nvPr>
+            <p:extLst>
+              <p:ext uri="{386F3935-93C4-4BCD-93E2-E3B085C9AB24}">
+                <p16:designElem xmlns:p16="http://schemas.microsoft.com/office/powerpoint/2015/main" val="1"/>
+              </p:ext>
+            </p:extLst>
+          </p:nvPr>
+        </p:nvCxnSpPr>
+        <p:spPr>
+          <a:xfrm>
+            <a:off x="6215641" y="1417320"/>
+            <a:ext cx="0" cy="4023360"/>
+          </a:xfrm>
+          <a:prstGeom prst="line">
+            <a:avLst/>
+          </a:prstGeom>
+          <a:ln w="15875">
+            <a:solidFill>
+              <a:schemeClr val="tx1"/>
+            </a:solidFill>
+          </a:ln>
+        </p:spPr>
+        <p:style>
+          <a:lnRef idx="1">
+            <a:schemeClr val="accent1"/>
+          </a:lnRef>
+          <a:fillRef idx="0">
+            <a:schemeClr val="accent1"/>
+          </a:fillRef>
+          <a:effectRef idx="0">
+            <a:schemeClr val="accent1"/>
+          </a:effectRef>
+          <a:fontRef idx="minor">
+            <a:schemeClr val="tx1"/>
+          </a:fontRef>
+        </p:style>
+      </p:cxnSp>
+    </p:spTree>
+    <p:extLst>
+      <p:ext uri="{BB962C8B-B14F-4D97-AF65-F5344CB8AC3E}">
+        <p14:creationId xmlns:p14="http://schemas.microsoft.com/office/powerpoint/2010/main" val="1144923443"/>
+      </p:ext>
+    </p:extLst>
+  </p:cSld>
+  <p:clrMapOvr>
+    <a:overrideClrMapping bg1="dk1" tx1="lt1" bg2="dk2" tx2="lt2" accent1="accent1" accent2="accent2" accent3="accent3" accent4="accent4" accent5="accent5" accent6="accent6" hlink="hlink" folHlink="folHlink"/>
+  </p:clrMapOvr>
+</p:sld>
+</file>
+
+<file path=ppt/slides/slide6.xml><?xml version="1.0" encoding="utf-8"?>
+<p:sld xmlns:a="http://schemas.openxmlformats.org/drawingml/2006/main" xmlns:r="http://schemas.openxmlformats.org/officeDocument/2006/relationships" xmlns:p="http://schemas.openxmlformats.org/presentationml/2006/main">
+  <p:cSld>
+    <p:bg>
+      <p:bgPr>
+        <a:solidFill>
+          <a:schemeClr val="bg1"/>
+        </a:solidFill>
+        <a:effectLst/>
+      </p:bgPr>
+    </p:bg>
     <p:spTree>
       <p:nvGrpSpPr>
         <p:cNvPr id="1" name=""/>
@@ -6938,10 +7274,75 @@
       </p:grpSpPr>
       <p:sp>
         <p:nvSpPr>
+          <p:cNvPr id="12" name="Rectangle 9">
+            <a:extLst>
+              <a:ext uri="{FF2B5EF4-FFF2-40B4-BE49-F238E27FC236}">
+                <a16:creationId xmlns:a16="http://schemas.microsoft.com/office/drawing/2014/main" id="{1707FC24-6981-43D9-B525-C7832BA22463}"/>
+              </a:ext>
+              <a:ext uri="{C183D7F6-B498-43B3-948B-1728B52AA6E4}">
+                <adec:decorative xmlns:adec="http://schemas.microsoft.com/office/drawing/2017/decorative" val="1"/>
+              </a:ext>
+            </a:extLst>
+          </p:cNvPr>
+          <p:cNvSpPr>
+            <a:spLocks noGrp="1" noRot="1" noChangeAspect="1" noMove="1" noResize="1" noEditPoints="1" noAdjustHandles="1" noChangeArrowheads="1" noChangeShapeType="1" noTextEdit="1"/>
+          </p:cNvSpPr>
+          <p:nvPr>
+            <p:extLst>
+              <p:ext uri="{386F3935-93C4-4BCD-93E2-E3B085C9AB24}">
+                <p16:designElem xmlns:p16="http://schemas.microsoft.com/office/powerpoint/2015/main" val="1"/>
+              </p:ext>
+            </p:extLst>
+          </p:nvPr>
+        </p:nvSpPr>
+        <p:spPr bwMode="ltGray">
+          <a:xfrm>
+            <a:off x="336884" y="311449"/>
+            <a:ext cx="4332307" cy="6179552"/>
+          </a:xfrm>
+          <a:prstGeom prst="rect">
+            <a:avLst/>
+          </a:prstGeom>
+          <a:solidFill>
+            <a:srgbClr val="404040"/>
+          </a:solidFill>
+          <a:ln w="127000" cap="sq" cmpd="thinThick">
+            <a:solidFill>
+              <a:srgbClr val="404040"/>
+            </a:solidFill>
+          </a:ln>
+        </p:spPr>
+        <p:style>
+          <a:lnRef idx="2">
+            <a:schemeClr val="accent1">
+              <a:shade val="50000"/>
+            </a:schemeClr>
+          </a:lnRef>
+          <a:fillRef idx="1">
+            <a:schemeClr val="accent1"/>
+          </a:fillRef>
+          <a:effectRef idx="0">
+            <a:schemeClr val="accent1"/>
+          </a:effectRef>
+          <a:fontRef idx="minor">
+            <a:schemeClr val="lt1"/>
+          </a:fontRef>
+        </p:style>
+        <p:txBody>
+          <a:bodyPr rtlCol="0" anchor="ctr"/>
+          <a:lstStyle/>
+          <a:p>
+            <a:pPr algn="ctr"/>
+            <a:endParaRPr lang="en-US"/>
+          </a:p>
+        </p:txBody>
+      </p:sp>
+      <p:sp>
+        <p:nvSpPr>
           <p:cNvPr id="2" name="Titre 1">
             <a:extLst>
               <a:ext uri="{FF2B5EF4-FFF2-40B4-BE49-F238E27FC236}">
-                <a16:creationId xmlns:a16="http://schemas.microsoft.com/office/drawing/2014/main" id="{6D3CF20D-1F62-981C-18CF-871354947664}"/>
+                <a16:creationId xmlns:a16="http://schemas.microsoft.com/office/drawing/2014/main" id="{253718F9-6EA2-CCBC-F928-5EC9F26C76B0}"/>
               </a:ext>
             </a:extLst>
           </p:cNvPr>
@@ -6952,23 +7353,67 @@
             <p:ph type="title"/>
           </p:nvPr>
         </p:nvSpPr>
-        <p:spPr/>
+        <p:spPr>
+          <a:xfrm>
+            <a:off x="742950" y="742951"/>
+            <a:ext cx="3476625" cy="4962524"/>
+          </a:xfrm>
+        </p:spPr>
         <p:txBody>
-          <a:bodyPr/>
+          <a:bodyPr vert="horz" lIns="91440" tIns="45720" rIns="91440" bIns="45720" rtlCol="0" anchor="ctr">
+            <a:normAutofit/>
+          </a:bodyPr>
           <a:lstStyle/>
           <a:p>
             <a:pPr algn="ctr"/>
             <a:r>
-              <a:rPr lang="fr-FR" dirty="0"/>
-              <a:t>3. Rendu Visuel Tablette</a:t>
+              <a:rPr lang="en-US" sz="4800" kern="1200">
+                <a:solidFill>
+                  <a:srgbClr val="FFFFFF"/>
+                </a:solidFill>
+                <a:latin typeface="+mj-lt"/>
+                <a:ea typeface="+mj-ea"/>
+                <a:cs typeface="+mj-cs"/>
+              </a:rPr>
+              <a:t>4. Rendu Visuel Mobile</a:t>
             </a:r>
           </a:p>
         </p:txBody>
       </p:sp>
+      <p:pic>
+        <p:nvPicPr>
+          <p:cNvPr id="5" name="Image 4">
+            <a:extLst>
+              <a:ext uri="{FF2B5EF4-FFF2-40B4-BE49-F238E27FC236}">
+                <a16:creationId xmlns:a16="http://schemas.microsoft.com/office/drawing/2014/main" id="{9414B64C-FEBC-8D20-ED50-1D12CCB7048D}"/>
+              </a:ext>
+            </a:extLst>
+          </p:cNvPr>
+          <p:cNvPicPr>
+            <a:picLocks noChangeAspect="1"/>
+          </p:cNvPicPr>
+          <p:nvPr/>
+        </p:nvPicPr>
+        <p:blipFill>
+          <a:blip r:embed="rId2"/>
+          <a:stretch>
+            <a:fillRect/>
+          </a:stretch>
+        </p:blipFill>
+        <p:spPr>
+          <a:xfrm>
+            <a:off x="6783972" y="492573"/>
+            <a:ext cx="3293245" cy="5880796"/>
+          </a:xfrm>
+          <a:prstGeom prst="rect">
+            <a:avLst/>
+          </a:prstGeom>
+        </p:spPr>
+      </p:pic>
     </p:spTree>
     <p:extLst>
       <p:ext uri="{BB962C8B-B14F-4D97-AF65-F5344CB8AC3E}">
-        <p14:creationId xmlns:p14="http://schemas.microsoft.com/office/powerpoint/2010/main" val="1144923443"/>
+        <p14:creationId xmlns:p14="http://schemas.microsoft.com/office/powerpoint/2010/main" val="1308882210"/>
       </p:ext>
     </p:extLst>
   </p:cSld>
@@ -6978,9 +7423,421 @@
 </p:sld>
 </file>
 
-<file path=ppt/slides/slide6.xml><?xml version="1.0" encoding="utf-8"?>
+<file path=ppt/slides/slide7.xml><?xml version="1.0" encoding="utf-8"?>
 <p:sld xmlns:a="http://schemas.openxmlformats.org/drawingml/2006/main" xmlns:r="http://schemas.openxmlformats.org/officeDocument/2006/relationships" xmlns:p="http://schemas.openxmlformats.org/presentationml/2006/main">
   <p:cSld>
+    <p:bg>
+      <p:bgPr>
+        <a:solidFill>
+          <a:schemeClr val="bg1"/>
+        </a:solidFill>
+        <a:effectLst/>
+      </p:bgPr>
+    </p:bg>
+    <p:spTree>
+      <p:nvGrpSpPr>
+        <p:cNvPr id="1" name=""/>
+        <p:cNvGrpSpPr/>
+        <p:nvPr/>
+      </p:nvGrpSpPr>
+      <p:grpSpPr>
+        <a:xfrm>
+          <a:off x="0" y="0"/>
+          <a:ext cx="0" cy="0"/>
+          <a:chOff x="0" y="0"/>
+          <a:chExt cx="0" cy="0"/>
+        </a:xfrm>
+      </p:grpSpPr>
+      <p:sp useBgFill="1">
+        <p:nvSpPr>
+          <p:cNvPr id="9" name="Rectangle 8">
+            <a:extLst>
+              <a:ext uri="{FF2B5EF4-FFF2-40B4-BE49-F238E27FC236}">
+                <a16:creationId xmlns:a16="http://schemas.microsoft.com/office/drawing/2014/main" id="{0671A8AE-40A1-4631-A6B8-581AFF065482}"/>
+              </a:ext>
+              <a:ext uri="{C183D7F6-B498-43B3-948B-1728B52AA6E4}">
+                <adec:decorative xmlns:adec="http://schemas.microsoft.com/office/drawing/2017/decorative" val="1"/>
+              </a:ext>
+            </a:extLst>
+          </p:cNvPr>
+          <p:cNvSpPr>
+            <a:spLocks noGrp="1" noRot="1" noChangeAspect="1" noMove="1" noResize="1" noEditPoints="1" noAdjustHandles="1" noChangeArrowheads="1" noChangeShapeType="1" noTextEdit="1"/>
+          </p:cNvSpPr>
+          <p:nvPr>
+            <p:extLst>
+              <p:ext uri="{386F3935-93C4-4BCD-93E2-E3B085C9AB24}">
+                <p16:designElem xmlns:p16="http://schemas.microsoft.com/office/powerpoint/2015/main" val="1"/>
+              </p:ext>
+            </p:extLst>
+          </p:nvPr>
+        </p:nvSpPr>
+        <p:spPr>
+          <a:xfrm>
+            <a:off x="0" y="0"/>
+            <a:ext cx="12192000" cy="6858000"/>
+          </a:xfrm>
+          <a:prstGeom prst="rect">
+            <a:avLst/>
+          </a:prstGeom>
+          <a:ln>
+            <a:noFill/>
+          </a:ln>
+        </p:spPr>
+        <p:style>
+          <a:lnRef idx="2">
+            <a:schemeClr val="accent1">
+              <a:shade val="50000"/>
+            </a:schemeClr>
+          </a:lnRef>
+          <a:fillRef idx="1">
+            <a:schemeClr val="accent1"/>
+          </a:fillRef>
+          <a:effectRef idx="0">
+            <a:schemeClr val="accent1"/>
+          </a:effectRef>
+          <a:fontRef idx="minor">
+            <a:schemeClr val="lt1"/>
+          </a:fontRef>
+        </p:style>
+        <p:txBody>
+          <a:bodyPr rtlCol="0" anchor="ctr"/>
+          <a:lstStyle/>
+          <a:p>
+            <a:pPr algn="ctr"/>
+            <a:endParaRPr lang="en-US"/>
+          </a:p>
+        </p:txBody>
+      </p:sp>
+      <p:pic>
+        <p:nvPicPr>
+          <p:cNvPr id="5" name="Picture 4" descr="Programmation de données sur un moniteur d’ordinateur">
+            <a:extLst>
+              <a:ext uri="{FF2B5EF4-FFF2-40B4-BE49-F238E27FC236}">
+                <a16:creationId xmlns:a16="http://schemas.microsoft.com/office/drawing/2014/main" id="{4F5A29A8-C96E-A81E-694F-9DEB25451B7E}"/>
+              </a:ext>
+            </a:extLst>
+          </p:cNvPr>
+          <p:cNvPicPr>
+            <a:picLocks noChangeAspect="1"/>
+          </p:cNvPicPr>
+          <p:nvPr/>
+        </p:nvPicPr>
+        <p:blipFill rotWithShape="1">
+          <a:blip r:embed="rId2"/>
+          <a:srcRect l="177" r="15449" b="-1"/>
+          <a:stretch/>
+        </p:blipFill>
+        <p:spPr>
+          <a:xfrm>
+            <a:off x="3523488" y="10"/>
+            <a:ext cx="8668512" cy="6857990"/>
+          </a:xfrm>
+          <a:prstGeom prst="rect">
+            <a:avLst/>
+          </a:prstGeom>
+        </p:spPr>
+      </p:pic>
+      <p:sp>
+        <p:nvSpPr>
+          <p:cNvPr id="11" name="Rectangle 10">
+            <a:extLst>
+              <a:ext uri="{FF2B5EF4-FFF2-40B4-BE49-F238E27FC236}">
+                <a16:creationId xmlns:a16="http://schemas.microsoft.com/office/drawing/2014/main" id="{AB58EF07-17C2-48CF-ABB0-EEF1F17CB8F0}"/>
+              </a:ext>
+              <a:ext uri="{C183D7F6-B498-43B3-948B-1728B52AA6E4}">
+                <adec:decorative xmlns:adec="http://schemas.microsoft.com/office/drawing/2017/decorative" val="1"/>
+              </a:ext>
+            </a:extLst>
+          </p:cNvPr>
+          <p:cNvSpPr>
+            <a:spLocks noGrp="1" noRot="1" noChangeAspect="1" noMove="1" noResize="1" noEditPoints="1" noAdjustHandles="1" noChangeArrowheads="1" noChangeShapeType="1" noTextEdit="1"/>
+          </p:cNvSpPr>
+          <p:nvPr>
+            <p:extLst>
+              <p:ext uri="{386F3935-93C4-4BCD-93E2-E3B085C9AB24}">
+                <p16:designElem xmlns:p16="http://schemas.microsoft.com/office/powerpoint/2015/main" val="1"/>
+              </p:ext>
+            </p:extLst>
+          </p:nvPr>
+        </p:nvSpPr>
+        <p:spPr>
+          <a:xfrm>
+            <a:off x="3" y="0"/>
+            <a:ext cx="9339206" cy="6858000"/>
+          </a:xfrm>
+          <a:prstGeom prst="rect">
+            <a:avLst/>
+          </a:prstGeom>
+          <a:gradFill>
+            <a:gsLst>
+              <a:gs pos="58000">
+                <a:schemeClr val="bg1"/>
+              </a:gs>
+              <a:gs pos="33000">
+                <a:schemeClr val="bg1">
+                  <a:alpha val="64000"/>
+                </a:schemeClr>
+              </a:gs>
+              <a:gs pos="0">
+                <a:schemeClr val="bg1">
+                  <a:alpha val="0"/>
+                </a:schemeClr>
+              </a:gs>
+              <a:gs pos="100000">
+                <a:schemeClr val="bg1"/>
+              </a:gs>
+            </a:gsLst>
+            <a:lin ang="10800000" scaled="0"/>
+          </a:gradFill>
+          <a:ln>
+            <a:noFill/>
+          </a:ln>
+        </p:spPr>
+        <p:style>
+          <a:lnRef idx="2">
+            <a:schemeClr val="accent1">
+              <a:shade val="50000"/>
+            </a:schemeClr>
+          </a:lnRef>
+          <a:fillRef idx="1">
+            <a:schemeClr val="accent1"/>
+          </a:fillRef>
+          <a:effectRef idx="0">
+            <a:schemeClr val="accent1"/>
+          </a:effectRef>
+          <a:fontRef idx="minor">
+            <a:schemeClr val="lt1"/>
+          </a:fontRef>
+        </p:style>
+        <p:txBody>
+          <a:bodyPr rtlCol="0" anchor="ctr"/>
+          <a:lstStyle/>
+          <a:p>
+            <a:pPr algn="ctr"/>
+            <a:endParaRPr lang="en-US" dirty="0"/>
+          </a:p>
+        </p:txBody>
+      </p:sp>
+      <p:sp>
+        <p:nvSpPr>
+          <p:cNvPr id="2" name="Titre 1">
+            <a:extLst>
+              <a:ext uri="{FF2B5EF4-FFF2-40B4-BE49-F238E27FC236}">
+                <a16:creationId xmlns:a16="http://schemas.microsoft.com/office/drawing/2014/main" id="{383C6C12-FD91-7794-B468-4118916110C8}"/>
+              </a:ext>
+            </a:extLst>
+          </p:cNvPr>
+          <p:cNvSpPr>
+            <a:spLocks noGrp="1"/>
+          </p:cNvSpPr>
+          <p:nvPr>
+            <p:ph type="title"/>
+          </p:nvPr>
+        </p:nvSpPr>
+        <p:spPr>
+          <a:xfrm>
+            <a:off x="477981" y="1122363"/>
+            <a:ext cx="4023360" cy="3204134"/>
+          </a:xfrm>
+        </p:spPr>
+        <p:txBody>
+          <a:bodyPr vert="horz" lIns="91440" tIns="45720" rIns="91440" bIns="45720" rtlCol="0" anchor="b">
+            <a:normAutofit/>
+          </a:bodyPr>
+          <a:lstStyle/>
+          <a:p>
+            <a:r>
+              <a:rPr lang="en-US" sz="4800"/>
+              <a:t>5. Code du Projet</a:t>
+            </a:r>
+          </a:p>
+        </p:txBody>
+      </p:sp>
+      <p:sp>
+        <p:nvSpPr>
+          <p:cNvPr id="13" name="Rectangle 12">
+            <a:extLst>
+              <a:ext uri="{FF2B5EF4-FFF2-40B4-BE49-F238E27FC236}">
+                <a16:creationId xmlns:a16="http://schemas.microsoft.com/office/drawing/2014/main" id="{AF2F604E-43BE-4DC3-B983-E071523364F8}"/>
+              </a:ext>
+              <a:ext uri="{C183D7F6-B498-43B3-948B-1728B52AA6E4}">
+                <adec:decorative xmlns:adec="http://schemas.microsoft.com/office/drawing/2017/decorative" val="1"/>
+              </a:ext>
+            </a:extLst>
+          </p:cNvPr>
+          <p:cNvSpPr>
+            <a:spLocks noGrp="1" noRot="1" noChangeAspect="1" noMove="1" noResize="1" noEditPoints="1" noAdjustHandles="1" noChangeArrowheads="1" noChangeShapeType="1" noTextEdit="1"/>
+          </p:cNvSpPr>
+          <p:nvPr>
+            <p:extLst>
+              <p:ext uri="{386F3935-93C4-4BCD-93E2-E3B085C9AB24}">
+                <p16:designElem xmlns:p16="http://schemas.microsoft.com/office/powerpoint/2015/main" val="1"/>
+              </p:ext>
+            </p:extLst>
+          </p:nvPr>
+        </p:nvSpPr>
+        <p:spPr>
+          <a:xfrm rot="5400000">
+            <a:off x="759921" y="346791"/>
+            <a:ext cx="146304" cy="704088"/>
+          </a:xfrm>
+          <a:prstGeom prst="rect">
+            <a:avLst/>
+          </a:prstGeom>
+          <a:solidFill>
+            <a:schemeClr val="accent2"/>
+          </a:solidFill>
+          <a:ln>
+            <a:noFill/>
+          </a:ln>
+        </p:spPr>
+        <p:style>
+          <a:lnRef idx="2">
+            <a:schemeClr val="accent1">
+              <a:shade val="50000"/>
+            </a:schemeClr>
+          </a:lnRef>
+          <a:fillRef idx="1">
+            <a:schemeClr val="accent1"/>
+          </a:fillRef>
+          <a:effectRef idx="0">
+            <a:schemeClr val="accent1"/>
+          </a:effectRef>
+          <a:fontRef idx="minor">
+            <a:schemeClr val="lt1"/>
+          </a:fontRef>
+        </p:style>
+        <p:txBody>
+          <a:bodyPr rtlCol="0" anchor="ctr"/>
+          <a:lstStyle/>
+          <a:p>
+            <a:pPr algn="ctr"/>
+            <a:endParaRPr lang="en-US">
+              <a:solidFill>
+                <a:prstClr val="white"/>
+              </a:solidFill>
+              <a:latin typeface="Calibri" panose="020F0502020204030204"/>
+            </a:endParaRPr>
+          </a:p>
+        </p:txBody>
+      </p:sp>
+      <p:sp>
+        <p:nvSpPr>
+          <p:cNvPr id="15" name="Rectangle 14">
+            <a:extLst>
+              <a:ext uri="{FF2B5EF4-FFF2-40B4-BE49-F238E27FC236}">
+                <a16:creationId xmlns:a16="http://schemas.microsoft.com/office/drawing/2014/main" id="{08C9B587-E65E-4B52-B37C-ABEBB6E87928}"/>
+              </a:ext>
+              <a:ext uri="{C183D7F6-B498-43B3-948B-1728B52AA6E4}">
+                <adec:decorative xmlns:adec="http://schemas.microsoft.com/office/drawing/2017/decorative" val="1"/>
+              </a:ext>
+            </a:extLst>
+          </p:cNvPr>
+          <p:cNvSpPr>
+            <a:spLocks noGrp="1" noRot="1" noChangeAspect="1" noMove="1" noResize="1" noEditPoints="1" noAdjustHandles="1" noChangeArrowheads="1" noChangeShapeType="1" noTextEdit="1"/>
+          </p:cNvSpPr>
+          <p:nvPr>
+            <p:extLst>
+              <p:ext uri="{386F3935-93C4-4BCD-93E2-E3B085C9AB24}">
+                <p16:designElem xmlns:p16="http://schemas.microsoft.com/office/powerpoint/2015/main" val="1"/>
+              </p:ext>
+            </p:extLst>
+          </p:nvPr>
+        </p:nvSpPr>
+        <p:spPr>
+          <a:xfrm>
+            <a:off x="481029" y="4546920"/>
+            <a:ext cx="3977640" cy="18288"/>
+          </a:xfrm>
+          <a:prstGeom prst="rect">
+            <a:avLst/>
+          </a:prstGeom>
+          <a:solidFill>
+            <a:schemeClr val="tx1"/>
+          </a:solidFill>
+          <a:ln w="3175">
+            <a:noFill/>
+          </a:ln>
+          <a:effectLst/>
+        </p:spPr>
+        <p:style>
+          <a:lnRef idx="2">
+            <a:schemeClr val="accent1">
+              <a:shade val="50000"/>
+            </a:schemeClr>
+          </a:lnRef>
+          <a:fillRef idx="1">
+            <a:schemeClr val="accent1"/>
+          </a:fillRef>
+          <a:effectRef idx="0">
+            <a:schemeClr val="accent1"/>
+          </a:effectRef>
+          <a:fontRef idx="minor">
+            <a:schemeClr val="lt1"/>
+          </a:fontRef>
+        </p:style>
+        <p:txBody>
+          <a:bodyPr rtlCol="0" anchor="ctr"/>
+          <a:lstStyle/>
+          <a:p>
+            <a:pPr marL="0" marR="0" lvl="0" indent="0" algn="ctr" defTabSz="914400" rtl="0" eaLnBrk="1" fontAlgn="auto" latinLnBrk="0" hangingPunct="1">
+              <a:lnSpc>
+                <a:spcPct val="100000"/>
+              </a:lnSpc>
+              <a:spcBef>
+                <a:spcPts val="0"/>
+              </a:spcBef>
+              <a:spcAft>
+                <a:spcPts val="0"/>
+              </a:spcAft>
+              <a:buClrTx/>
+              <a:buSzTx/>
+              <a:buFontTx/>
+              <a:buNone/>
+              <a:tabLst/>
+              <a:defRPr/>
+            </a:pPr>
+            <a:endParaRPr kumimoji="0" lang="en-US" sz="1800" b="0" i="0" u="none" strike="noStrike" kern="1200" cap="none" spc="0" normalizeH="0" baseline="0" noProof="0">
+              <a:ln>
+                <a:noFill/>
+              </a:ln>
+              <a:solidFill>
+                <a:prstClr val="white"/>
+              </a:solidFill>
+              <a:effectLst/>
+              <a:uLnTx/>
+              <a:uFillTx/>
+              <a:latin typeface="Calibri" panose="020F0502020204030204"/>
+              <a:ea typeface="+mn-ea"/>
+              <a:cs typeface="+mn-cs"/>
+            </a:endParaRPr>
+          </a:p>
+        </p:txBody>
+      </p:sp>
+    </p:spTree>
+    <p:extLst>
+      <p:ext uri="{BB962C8B-B14F-4D97-AF65-F5344CB8AC3E}">
+        <p14:creationId xmlns:p14="http://schemas.microsoft.com/office/powerpoint/2010/main" val="2789736149"/>
+      </p:ext>
+    </p:extLst>
+  </p:cSld>
+  <p:clrMapOvr>
+    <a:overrideClrMapping bg1="dk1" tx1="lt1" bg2="dk2" tx2="lt2" accent1="accent1" accent2="accent2" accent3="accent3" accent4="accent4" accent5="accent5" accent6="accent6" hlink="hlink" folHlink="folHlink"/>
+  </p:clrMapOvr>
+</p:sld>
+</file>
+
+<file path=ppt/slides/slide8.xml><?xml version="1.0" encoding="utf-8"?>
+<p:sld xmlns:a="http://schemas.openxmlformats.org/drawingml/2006/main" xmlns:r="http://schemas.openxmlformats.org/officeDocument/2006/relationships" xmlns:p="http://schemas.openxmlformats.org/presentationml/2006/main">
+  <p:cSld>
+    <p:bg>
+      <p:bgPr>
+        <a:solidFill>
+          <a:schemeClr val="bg1"/>
+        </a:solidFill>
+        <a:effectLst/>
+      </p:bgPr>
+    </p:bg>
     <p:spTree>
       <p:nvGrpSpPr>
         <p:cNvPr id="1" name=""/>
@@ -6997,39 +7854,75 @@
       </p:grpSpPr>
       <p:sp>
         <p:nvSpPr>
-          <p:cNvPr id="2" name="Titre 1">
-            <a:extLst>
-              <a:ext uri="{FF2B5EF4-FFF2-40B4-BE49-F238E27FC236}">
-                <a16:creationId xmlns:a16="http://schemas.microsoft.com/office/drawing/2014/main" id="{253718F9-6EA2-CCBC-F928-5EC9F26C76B0}"/>
+          <p:cNvPr id="21" name="Rectangle 20">
+            <a:extLst>
+              <a:ext uri="{FF2B5EF4-FFF2-40B4-BE49-F238E27FC236}">
+                <a16:creationId xmlns:a16="http://schemas.microsoft.com/office/drawing/2014/main" id="{823AC064-BC96-4F32-8AE1-B2FD38754823}"/>
+              </a:ext>
+              <a:ext uri="{C183D7F6-B498-43B3-948B-1728B52AA6E4}">
+                <adec:decorative xmlns:adec="http://schemas.microsoft.com/office/drawing/2017/decorative" val="1"/>
               </a:ext>
             </a:extLst>
           </p:cNvPr>
           <p:cNvSpPr>
-            <a:spLocks noGrp="1"/>
+            <a:spLocks noGrp="1" noRot="1" noChangeAspect="1" noMove="1" noResize="1" noEditPoints="1" noAdjustHandles="1" noChangeArrowheads="1" noChangeShapeType="1" noTextEdit="1"/>
           </p:cNvSpPr>
           <p:nvPr>
-            <p:ph type="title"/>
+            <p:extLst>
+              <p:ext uri="{386F3935-93C4-4BCD-93E2-E3B085C9AB24}">
+                <p16:designElem xmlns:p16="http://schemas.microsoft.com/office/powerpoint/2015/main" val="1"/>
+              </p:ext>
+            </p:extLst>
           </p:nvPr>
         </p:nvSpPr>
-        <p:spPr/>
+        <p:spPr bwMode="ltGray">
+          <a:xfrm>
+            <a:off x="396882" y="280374"/>
+            <a:ext cx="11438793" cy="1844256"/>
+          </a:xfrm>
+          <a:prstGeom prst="rect">
+            <a:avLst/>
+          </a:prstGeom>
+          <a:solidFill>
+            <a:srgbClr val="404040"/>
+          </a:solidFill>
+          <a:ln w="127000" cap="sq" cmpd="thinThick">
+            <a:solidFill>
+              <a:srgbClr val="404040"/>
+            </a:solidFill>
+          </a:ln>
+        </p:spPr>
+        <p:style>
+          <a:lnRef idx="2">
+            <a:schemeClr val="accent1">
+              <a:shade val="50000"/>
+            </a:schemeClr>
+          </a:lnRef>
+          <a:fillRef idx="1">
+            <a:schemeClr val="accent1"/>
+          </a:fillRef>
+          <a:effectRef idx="0">
+            <a:schemeClr val="accent1"/>
+          </a:effectRef>
+          <a:fontRef idx="minor">
+            <a:schemeClr val="lt1"/>
+          </a:fontRef>
+        </p:style>
         <p:txBody>
-          <a:bodyPr/>
+          <a:bodyPr rtlCol="0" anchor="ctr"/>
           <a:lstStyle/>
           <a:p>
             <a:pPr algn="ctr"/>
-            <a:r>
-              <a:rPr lang="fr-FR" dirty="0"/>
-              <a:t>4. Rendu Visuel Mobile</a:t>
-            </a:r>
+            <a:endParaRPr lang="en-US"/>
           </a:p>
         </p:txBody>
       </p:sp>
       <p:sp>
         <p:nvSpPr>
-          <p:cNvPr id="3" name="Espace réservé du contenu 2">
-            <a:extLst>
-              <a:ext uri="{FF2B5EF4-FFF2-40B4-BE49-F238E27FC236}">
-                <a16:creationId xmlns:a16="http://schemas.microsoft.com/office/drawing/2014/main" id="{86643B2A-298B-2BDE-D75F-7A2838027EE1}"/>
+          <p:cNvPr id="2" name="Titre 1">
+            <a:extLst>
+              <a:ext uri="{FF2B5EF4-FFF2-40B4-BE49-F238E27FC236}">
+                <a16:creationId xmlns:a16="http://schemas.microsoft.com/office/drawing/2014/main" id="{A4CDC451-9759-E8FC-A2DB-CE31861B28F6}"/>
               </a:ext>
             </a:extLst>
           </p:cNvPr>
@@ -7037,22 +7930,201 @@
             <a:spLocks noGrp="1"/>
           </p:cNvSpPr>
           <p:nvPr>
-            <p:ph idx="1"/>
+            <p:ph type="title"/>
           </p:nvPr>
         </p:nvSpPr>
-        <p:spPr/>
+        <p:spPr>
+          <a:xfrm>
+            <a:off x="546351" y="433545"/>
+            <a:ext cx="11139854" cy="930447"/>
+          </a:xfrm>
+        </p:spPr>
         <p:txBody>
-          <a:bodyPr/>
+          <a:bodyPr vert="horz" lIns="91440" tIns="45720" rIns="91440" bIns="45720" rtlCol="0" anchor="b">
+            <a:normAutofit/>
+          </a:bodyPr>
           <a:lstStyle/>
           <a:p>
-            <a:endParaRPr lang="fr-FR" dirty="0"/>
+            <a:pPr algn="ctr"/>
+            <a:r>
+              <a:rPr lang="en-US" sz="5400">
+                <a:solidFill>
+                  <a:srgbClr val="FFFFFF"/>
+                </a:solidFill>
+              </a:rPr>
+              <a:t>6. Vérification W3 HTML / CSS</a:t>
+            </a:r>
           </a:p>
         </p:txBody>
       </p:sp>
+      <p:cxnSp>
+        <p:nvCxnSpPr>
+          <p:cNvPr id="23" name="Straight Connector 22">
+            <a:extLst>
+              <a:ext uri="{FF2B5EF4-FFF2-40B4-BE49-F238E27FC236}">
+                <a16:creationId xmlns:a16="http://schemas.microsoft.com/office/drawing/2014/main" id="{7E7C77BC-7138-40B1-A15B-20F57A494629}"/>
+              </a:ext>
+              <a:ext uri="{C183D7F6-B498-43B3-948B-1728B52AA6E4}">
+                <adec:decorative xmlns:adec="http://schemas.microsoft.com/office/drawing/2017/decorative" val="1"/>
+              </a:ext>
+            </a:extLst>
+          </p:cNvPr>
+          <p:cNvCxnSpPr>
+            <a:cxnSpLocks noGrp="1" noRot="1" noChangeAspect="1" noMove="1" noResize="1" noEditPoints="1" noAdjustHandles="1" noChangeArrowheads="1" noChangeShapeType="1"/>
+          </p:cNvCxnSpPr>
+          <p:nvPr>
+            <p:extLst>
+              <p:ext uri="{386F3935-93C4-4BCD-93E2-E3B085C9AB24}">
+                <p16:designElem xmlns:p16="http://schemas.microsoft.com/office/powerpoint/2015/main" val="1"/>
+              </p:ext>
+            </p:extLst>
+          </p:nvPr>
+        </p:nvCxnSpPr>
+        <p:spPr>
+          <a:xfrm>
+            <a:off x="2230078" y="1522292"/>
+            <a:ext cx="7772400" cy="0"/>
+          </a:xfrm>
+          <a:prstGeom prst="line">
+            <a:avLst/>
+          </a:prstGeom>
+          <a:ln w="22225">
+            <a:solidFill>
+              <a:srgbClr val="D9D9D9"/>
+            </a:solidFill>
+          </a:ln>
+        </p:spPr>
+        <p:style>
+          <a:lnRef idx="1">
+            <a:schemeClr val="accent1"/>
+          </a:lnRef>
+          <a:fillRef idx="0">
+            <a:schemeClr val="accent1"/>
+          </a:fillRef>
+          <a:effectRef idx="0">
+            <a:schemeClr val="accent1"/>
+          </a:effectRef>
+          <a:fontRef idx="minor">
+            <a:schemeClr val="tx1"/>
+          </a:fontRef>
+        </p:style>
+      </p:cxnSp>
+      <p:pic>
+        <p:nvPicPr>
+          <p:cNvPr id="7" name="Image 6">
+            <a:extLst>
+              <a:ext uri="{FF2B5EF4-FFF2-40B4-BE49-F238E27FC236}">
+                <a16:creationId xmlns:a16="http://schemas.microsoft.com/office/drawing/2014/main" id="{99ABDB03-9911-2F6F-30DE-0C8F05BB2EAE}"/>
+              </a:ext>
+            </a:extLst>
+          </p:cNvPr>
+          <p:cNvPicPr>
+            <a:picLocks noChangeAspect="1"/>
+          </p:cNvPicPr>
+          <p:nvPr/>
+        </p:nvPicPr>
+        <p:blipFill>
+          <a:blip r:embed="rId2"/>
+          <a:stretch>
+            <a:fillRect/>
+          </a:stretch>
+        </p:blipFill>
+        <p:spPr>
+          <a:xfrm>
+            <a:off x="496938" y="2426818"/>
+            <a:ext cx="5125175" cy="3997637"/>
+          </a:xfrm>
+          <a:prstGeom prst="rect">
+            <a:avLst/>
+          </a:prstGeom>
+        </p:spPr>
+      </p:pic>
+      <p:cxnSp>
+        <p:nvCxnSpPr>
+          <p:cNvPr id="25" name="Straight Connector 24">
+            <a:extLst>
+              <a:ext uri="{FF2B5EF4-FFF2-40B4-BE49-F238E27FC236}">
+                <a16:creationId xmlns:a16="http://schemas.microsoft.com/office/drawing/2014/main" id="{DB146403-F3D6-484B-B2ED-97F9565D0370}"/>
+              </a:ext>
+              <a:ext uri="{C183D7F6-B498-43B3-948B-1728B52AA6E4}">
+                <adec:decorative xmlns:adec="http://schemas.microsoft.com/office/drawing/2017/decorative" val="1"/>
+              </a:ext>
+            </a:extLst>
+          </p:cNvPr>
+          <p:cNvCxnSpPr>
+            <a:cxnSpLocks noGrp="1" noRot="1" noChangeAspect="1" noMove="1" noResize="1" noEditPoints="1" noAdjustHandles="1" noChangeArrowheads="1" noChangeShapeType="1"/>
+          </p:cNvCxnSpPr>
+          <p:nvPr>
+            <p:extLst>
+              <p:ext uri="{386F3935-93C4-4BCD-93E2-E3B085C9AB24}">
+                <p16:designElem xmlns:p16="http://schemas.microsoft.com/office/powerpoint/2015/main" val="1"/>
+              </p:ext>
+            </p:extLst>
+          </p:nvPr>
+        </p:nvCxnSpPr>
+        <p:spPr>
+          <a:xfrm>
+            <a:off x="6116278" y="2596836"/>
+            <a:ext cx="0" cy="3657600"/>
+          </a:xfrm>
+          <a:prstGeom prst="line">
+            <a:avLst/>
+          </a:prstGeom>
+          <a:ln w="101600" cmpd="dbl">
+            <a:solidFill>
+              <a:srgbClr val="595959"/>
+            </a:solidFill>
+          </a:ln>
+        </p:spPr>
+        <p:style>
+          <a:lnRef idx="1">
+            <a:schemeClr val="accent1"/>
+          </a:lnRef>
+          <a:fillRef idx="0">
+            <a:schemeClr val="accent1"/>
+          </a:fillRef>
+          <a:effectRef idx="0">
+            <a:schemeClr val="accent1"/>
+          </a:effectRef>
+          <a:fontRef idx="minor">
+            <a:schemeClr val="tx1"/>
+          </a:fontRef>
+        </p:style>
+      </p:cxnSp>
+      <p:pic>
+        <p:nvPicPr>
+          <p:cNvPr id="5" name="Image 4">
+            <a:extLst>
+              <a:ext uri="{FF2B5EF4-FFF2-40B4-BE49-F238E27FC236}">
+                <a16:creationId xmlns:a16="http://schemas.microsoft.com/office/drawing/2014/main" id="{CDF8F2F2-2AF2-8EBB-764B-C33C9C449589}"/>
+              </a:ext>
+            </a:extLst>
+          </p:cNvPr>
+          <p:cNvPicPr>
+            <a:picLocks noChangeAspect="1"/>
+          </p:cNvPicPr>
+          <p:nvPr/>
+        </p:nvPicPr>
+        <p:blipFill>
+          <a:blip r:embed="rId3"/>
+          <a:stretch>
+            <a:fillRect/>
+          </a:stretch>
+        </p:blipFill>
+        <p:spPr>
+          <a:xfrm>
+            <a:off x="6445073" y="3041198"/>
+            <a:ext cx="5455917" cy="2768877"/>
+          </a:xfrm>
+          <a:prstGeom prst="rect">
+            <a:avLst/>
+          </a:prstGeom>
+        </p:spPr>
+      </p:pic>
     </p:spTree>
     <p:extLst>
       <p:ext uri="{BB962C8B-B14F-4D97-AF65-F5344CB8AC3E}">
-        <p14:creationId xmlns:p14="http://schemas.microsoft.com/office/powerpoint/2010/main" val="1308882210"/>
+        <p14:creationId xmlns:p14="http://schemas.microsoft.com/office/powerpoint/2010/main" val="2625945390"/>
       </p:ext>
     </p:extLst>
   </p:cSld>
@@ -7062,9 +8134,17 @@
 </p:sld>
 </file>
 
-<file path=ppt/slides/slide7.xml><?xml version="1.0" encoding="utf-8"?>
+<file path=ppt/slides/slide9.xml><?xml version="1.0" encoding="utf-8"?>
 <p:sld xmlns:a="http://schemas.openxmlformats.org/drawingml/2006/main" xmlns:r="http://schemas.openxmlformats.org/officeDocument/2006/relationships" xmlns:p="http://schemas.openxmlformats.org/presentationml/2006/main">
   <p:cSld>
+    <p:bg>
+      <p:bgPr>
+        <a:solidFill>
+          <a:schemeClr val="bg1"/>
+        </a:solidFill>
+        <a:effectLst/>
+      </p:bgPr>
+    </p:bg>
     <p:spTree>
       <p:nvGrpSpPr>
         <p:cNvPr id="1" name=""/>
@@ -7079,41 +8159,133 @@
           <a:chExt cx="0" cy="0"/>
         </a:xfrm>
       </p:grpSpPr>
+      <p:cxnSp>
+        <p:nvCxnSpPr>
+          <p:cNvPr id="1031" name="Straight Connector 1030">
+            <a:extLst>
+              <a:ext uri="{FF2B5EF4-FFF2-40B4-BE49-F238E27FC236}">
+                <a16:creationId xmlns:a16="http://schemas.microsoft.com/office/drawing/2014/main" id="{D2E961F1-4A28-4A5F-BBD4-6E400E5E6C75}"/>
+              </a:ext>
+              <a:ext uri="{C183D7F6-B498-43B3-948B-1728B52AA6E4}">
+                <adec:decorative xmlns:adec="http://schemas.microsoft.com/office/drawing/2017/decorative" val="1"/>
+              </a:ext>
+            </a:extLst>
+          </p:cNvPr>
+          <p:cNvCxnSpPr>
+            <a:cxnSpLocks noGrp="1" noRot="1" noChangeAspect="1" noMove="1" noResize="1" noEditPoints="1" noAdjustHandles="1" noChangeArrowheads="1" noChangeShapeType="1"/>
+          </p:cNvCxnSpPr>
+          <p:nvPr>
+            <p:extLst>
+              <p:ext uri="{386F3935-93C4-4BCD-93E2-E3B085C9AB24}">
+                <p16:designElem xmlns:p16="http://schemas.microsoft.com/office/powerpoint/2015/main" val="1"/>
+              </p:ext>
+            </p:extLst>
+          </p:nvPr>
+        </p:nvCxnSpPr>
+        <p:spPr bwMode="white">
+          <a:xfrm>
+            <a:off x="0" y="272357"/>
+            <a:ext cx="12188824" cy="0"/>
+          </a:xfrm>
+          <a:prstGeom prst="line">
+            <a:avLst/>
+          </a:prstGeom>
+          <a:ln w="50800">
+            <a:solidFill>
+              <a:schemeClr val="tx1">
+                <a:lumMod val="75000"/>
+                <a:lumOff val="25000"/>
+              </a:schemeClr>
+            </a:solidFill>
+          </a:ln>
+        </p:spPr>
+        <p:style>
+          <a:lnRef idx="1">
+            <a:schemeClr val="accent1"/>
+          </a:lnRef>
+          <a:fillRef idx="0">
+            <a:schemeClr val="accent1"/>
+          </a:fillRef>
+          <a:effectRef idx="0">
+            <a:schemeClr val="accent1"/>
+          </a:effectRef>
+          <a:fontRef idx="minor">
+            <a:schemeClr val="tx1"/>
+          </a:fontRef>
+        </p:style>
+      </p:cxnSp>
       <p:sp>
         <p:nvSpPr>
-          <p:cNvPr id="2" name="Titre 1">
-            <a:extLst>
-              <a:ext uri="{FF2B5EF4-FFF2-40B4-BE49-F238E27FC236}">
-                <a16:creationId xmlns:a16="http://schemas.microsoft.com/office/drawing/2014/main" id="{383C6C12-FD91-7794-B468-4118916110C8}"/>
+          <p:cNvPr id="1033" name="Rectangle 1032">
+            <a:extLst>
+              <a:ext uri="{FF2B5EF4-FFF2-40B4-BE49-F238E27FC236}">
+                <a16:creationId xmlns:a16="http://schemas.microsoft.com/office/drawing/2014/main" id="{7F57BEA8-497D-4AA8-8A18-BDCD696B25FE}"/>
+              </a:ext>
+              <a:ext uri="{C183D7F6-B498-43B3-948B-1728B52AA6E4}">
+                <adec:decorative xmlns:adec="http://schemas.microsoft.com/office/drawing/2017/decorative" val="1"/>
               </a:ext>
             </a:extLst>
           </p:cNvPr>
           <p:cNvSpPr>
-            <a:spLocks noGrp="1"/>
+            <a:spLocks noGrp="1" noRot="1" noChangeAspect="1" noMove="1" noResize="1" noEditPoints="1" noAdjustHandles="1" noChangeArrowheads="1" noChangeShapeType="1" noTextEdit="1"/>
           </p:cNvSpPr>
           <p:nvPr>
-            <p:ph type="title"/>
+            <p:extLst>
+              <p:ext uri="{386F3935-93C4-4BCD-93E2-E3B085C9AB24}">
+                <p16:designElem xmlns:p16="http://schemas.microsoft.com/office/powerpoint/2015/main" val="1"/>
+              </p:ext>
+            </p:extLst>
           </p:nvPr>
         </p:nvSpPr>
-        <p:spPr/>
+        <p:spPr>
+          <a:xfrm>
+            <a:off x="0" y="368596"/>
+            <a:ext cx="12192000" cy="1735555"/>
+          </a:xfrm>
+          <a:prstGeom prst="rect">
+            <a:avLst/>
+          </a:prstGeom>
+          <a:solidFill>
+            <a:schemeClr val="tx1">
+              <a:lumMod val="75000"/>
+              <a:lumOff val="25000"/>
+            </a:schemeClr>
+          </a:solidFill>
+          <a:ln>
+            <a:noFill/>
+          </a:ln>
+        </p:spPr>
+        <p:style>
+          <a:lnRef idx="2">
+            <a:schemeClr val="accent1">
+              <a:shade val="50000"/>
+            </a:schemeClr>
+          </a:lnRef>
+          <a:fillRef idx="1">
+            <a:schemeClr val="accent1"/>
+          </a:fillRef>
+          <a:effectRef idx="0">
+            <a:schemeClr val="accent1"/>
+          </a:effectRef>
+          <a:fontRef idx="minor">
+            <a:schemeClr val="lt1"/>
+          </a:fontRef>
+        </p:style>
         <p:txBody>
-          <a:bodyPr/>
+          <a:bodyPr rtlCol="0" anchor="ctr"/>
           <a:lstStyle/>
           <a:p>
             <a:pPr algn="ctr"/>
-            <a:r>
-              <a:rPr lang="fr-FR" dirty="0"/>
-              <a:t>5. Code du Projet</a:t>
-            </a:r>
+            <a:endParaRPr lang="en-US"/>
           </a:p>
         </p:txBody>
       </p:sp>
       <p:sp>
         <p:nvSpPr>
-          <p:cNvPr id="3" name="Espace réservé du contenu 2">
-            <a:extLst>
-              <a:ext uri="{FF2B5EF4-FFF2-40B4-BE49-F238E27FC236}">
-                <a16:creationId xmlns:a16="http://schemas.microsoft.com/office/drawing/2014/main" id="{CA0AE6F7-FBF5-82B5-4151-B448F70C80FC}"/>
+          <p:cNvPr id="2" name="Titre 1">
+            <a:extLst>
+              <a:ext uri="{FF2B5EF4-FFF2-40B4-BE49-F238E27FC236}">
+                <a16:creationId xmlns:a16="http://schemas.microsoft.com/office/drawing/2014/main" id="{B2CCF0FC-1B8E-C342-BF18-32858F66EDF9}"/>
               </a:ext>
             </a:extLst>
           </p:cNvPr>
@@ -7121,102 +8293,191 @@
             <a:spLocks noGrp="1"/>
           </p:cNvSpPr>
           <p:nvPr>
-            <p:ph idx="1"/>
+            <p:ph type="title"/>
           </p:nvPr>
         </p:nvSpPr>
-        <p:spPr/>
+        <p:spPr>
+          <a:xfrm>
+            <a:off x="526073" y="489439"/>
+            <a:ext cx="11139854" cy="930447"/>
+          </a:xfrm>
+        </p:spPr>
         <p:txBody>
-          <a:bodyPr/>
+          <a:bodyPr vert="horz" lIns="91440" tIns="45720" rIns="91440" bIns="45720" rtlCol="0" anchor="b">
+            <a:normAutofit/>
+          </a:bodyPr>
           <a:lstStyle/>
           <a:p>
-            <a:endParaRPr lang="fr-FR"/>
+            <a:pPr algn="ctr"/>
+            <a:r>
+              <a:rPr lang="en-US" sz="5400" kern="1200">
+                <a:solidFill>
+                  <a:schemeClr val="bg1"/>
+                </a:solidFill>
+                <a:latin typeface="+mj-lt"/>
+                <a:ea typeface="+mj-ea"/>
+                <a:cs typeface="+mj-cs"/>
+              </a:rPr>
+              <a:t>7. Bilan</a:t>
+            </a:r>
           </a:p>
         </p:txBody>
       </p:sp>
-    </p:spTree>
-    <p:extLst>
-      <p:ext uri="{BB962C8B-B14F-4D97-AF65-F5344CB8AC3E}">
-        <p14:creationId xmlns:p14="http://schemas.microsoft.com/office/powerpoint/2010/main" val="2789736149"/>
-      </p:ext>
-    </p:extLst>
-  </p:cSld>
-  <p:clrMapOvr>
-    <a:masterClrMapping/>
-  </p:clrMapOvr>
-</p:sld>
-</file>
-
-<file path=ppt/slides/slide8.xml><?xml version="1.0" encoding="utf-8"?>
-<p:sld xmlns:a="http://schemas.openxmlformats.org/drawingml/2006/main" xmlns:r="http://schemas.openxmlformats.org/officeDocument/2006/relationships" xmlns:p="http://schemas.openxmlformats.org/presentationml/2006/main">
-  <p:cSld>
-    <p:spTree>
-      <p:nvGrpSpPr>
-        <p:cNvPr id="1" name=""/>
-        <p:cNvGrpSpPr/>
-        <p:nvPr/>
-      </p:nvGrpSpPr>
-      <p:grpSpPr>
-        <a:xfrm>
-          <a:off x="0" y="0"/>
-          <a:ext cx="0" cy="0"/>
-          <a:chOff x="0" y="0"/>
-          <a:chExt cx="0" cy="0"/>
-        </a:xfrm>
-      </p:grpSpPr>
-      <p:sp>
-        <p:nvSpPr>
-          <p:cNvPr id="2" name="Titre 1">
-            <a:extLst>
-              <a:ext uri="{FF2B5EF4-FFF2-40B4-BE49-F238E27FC236}">
-                <a16:creationId xmlns:a16="http://schemas.microsoft.com/office/drawing/2014/main" id="{B2CCF0FC-1B8E-C342-BF18-32858F66EDF9}"/>
-              </a:ext>
-            </a:extLst>
-          </p:cNvPr>
-          <p:cNvSpPr>
-            <a:spLocks noGrp="1"/>
-          </p:cNvSpPr>
-          <p:nvPr>
-            <p:ph type="title"/>
-          </p:nvPr>
-        </p:nvSpPr>
-        <p:spPr/>
-        <p:txBody>
-          <a:bodyPr/>
-          <a:lstStyle/>
-          <a:p>
-            <a:pPr algn="ctr"/>
-            <a:r>
-              <a:rPr lang="fr-FR" dirty="0"/>
-              <a:t>6. Bilan</a:t>
-            </a:r>
-          </a:p>
-        </p:txBody>
-      </p:sp>
-      <p:sp>
-        <p:nvSpPr>
-          <p:cNvPr id="3" name="Espace réservé du contenu 2">
-            <a:extLst>
-              <a:ext uri="{FF2B5EF4-FFF2-40B4-BE49-F238E27FC236}">
-                <a16:creationId xmlns:a16="http://schemas.microsoft.com/office/drawing/2014/main" id="{15AA67A7-FD55-DFF1-64A6-E747888831DE}"/>
-              </a:ext>
-            </a:extLst>
-          </p:cNvPr>
-          <p:cNvSpPr>
-            <a:spLocks noGrp="1"/>
-          </p:cNvSpPr>
-          <p:nvPr>
-            <p:ph idx="1"/>
-          </p:nvPr>
-        </p:nvSpPr>
-        <p:spPr/>
-        <p:txBody>
-          <a:bodyPr/>
-          <a:lstStyle/>
-          <a:p>
-            <a:endParaRPr lang="fr-FR"/>
-          </a:p>
-        </p:txBody>
-      </p:sp>
+      <p:cxnSp>
+        <p:nvCxnSpPr>
+          <p:cNvPr id="1035" name="Straight Connector 1034">
+            <a:extLst>
+              <a:ext uri="{FF2B5EF4-FFF2-40B4-BE49-F238E27FC236}">
+                <a16:creationId xmlns:a16="http://schemas.microsoft.com/office/drawing/2014/main" id="{A82415D3-DDE5-4D63-8CB3-23A5EC581B27}"/>
+              </a:ext>
+              <a:ext uri="{C183D7F6-B498-43B3-948B-1728B52AA6E4}">
+                <adec:decorative xmlns:adec="http://schemas.microsoft.com/office/drawing/2017/decorative" val="1"/>
+              </a:ext>
+            </a:extLst>
+          </p:cNvPr>
+          <p:cNvCxnSpPr>
+            <a:cxnSpLocks noGrp="1" noRot="1" noChangeAspect="1" noMove="1" noResize="1" noEditPoints="1" noAdjustHandles="1" noChangeArrowheads="1" noChangeShapeType="1"/>
+          </p:cNvCxnSpPr>
+          <p:nvPr>
+            <p:extLst>
+              <p:ext uri="{386F3935-93C4-4BCD-93E2-E3B085C9AB24}">
+                <p16:designElem xmlns:p16="http://schemas.microsoft.com/office/powerpoint/2015/main" val="1"/>
+              </p:ext>
+            </p:extLst>
+          </p:nvPr>
+        </p:nvCxnSpPr>
+        <p:spPr>
+          <a:xfrm>
+            <a:off x="4724400" y="1479733"/>
+            <a:ext cx="2743200" cy="0"/>
+          </a:xfrm>
+          <a:prstGeom prst="line">
+            <a:avLst/>
+          </a:prstGeom>
+          <a:ln w="19050">
+            <a:solidFill>
+              <a:schemeClr val="bg1">
+                <a:alpha val="75000"/>
+              </a:schemeClr>
+            </a:solidFill>
+          </a:ln>
+        </p:spPr>
+        <p:style>
+          <a:lnRef idx="1">
+            <a:schemeClr val="accent1"/>
+          </a:lnRef>
+          <a:fillRef idx="0">
+            <a:schemeClr val="accent1"/>
+          </a:fillRef>
+          <a:effectRef idx="0">
+            <a:schemeClr val="accent1"/>
+          </a:effectRef>
+          <a:fontRef idx="minor">
+            <a:schemeClr val="tx1"/>
+          </a:fontRef>
+        </p:style>
+      </p:cxnSp>
+      <p:cxnSp>
+        <p:nvCxnSpPr>
+          <p:cNvPr id="1037" name="Straight Connector 1036">
+            <a:extLst>
+              <a:ext uri="{FF2B5EF4-FFF2-40B4-BE49-F238E27FC236}">
+                <a16:creationId xmlns:a16="http://schemas.microsoft.com/office/drawing/2014/main" id="{AD7193FB-6AE6-4B3B-8F89-56B55DD63B4D}"/>
+              </a:ext>
+              <a:ext uri="{C183D7F6-B498-43B3-948B-1728B52AA6E4}">
+                <adec:decorative xmlns:adec="http://schemas.microsoft.com/office/drawing/2017/decorative" val="1"/>
+              </a:ext>
+            </a:extLst>
+          </p:cNvPr>
+          <p:cNvCxnSpPr>
+            <a:cxnSpLocks noGrp="1" noRot="1" noChangeAspect="1" noMove="1" noResize="1" noEditPoints="1" noAdjustHandles="1" noChangeArrowheads="1" noChangeShapeType="1"/>
+          </p:cNvCxnSpPr>
+          <p:nvPr>
+            <p:extLst>
+              <p:ext uri="{386F3935-93C4-4BCD-93E2-E3B085C9AB24}">
+                <p16:designElem xmlns:p16="http://schemas.microsoft.com/office/powerpoint/2015/main" val="1"/>
+              </p:ext>
+            </p:extLst>
+          </p:nvPr>
+        </p:nvCxnSpPr>
+        <p:spPr bwMode="white">
+          <a:xfrm>
+            <a:off x="0" y="2201402"/>
+            <a:ext cx="12188824" cy="0"/>
+          </a:xfrm>
+          <a:prstGeom prst="line">
+            <a:avLst/>
+          </a:prstGeom>
+          <a:ln w="50800">
+            <a:solidFill>
+              <a:schemeClr val="tx1">
+                <a:lumMod val="75000"/>
+                <a:lumOff val="25000"/>
+              </a:schemeClr>
+            </a:solidFill>
+          </a:ln>
+        </p:spPr>
+        <p:style>
+          <a:lnRef idx="1">
+            <a:schemeClr val="accent1"/>
+          </a:lnRef>
+          <a:fillRef idx="0">
+            <a:schemeClr val="accent1"/>
+          </a:fillRef>
+          <a:effectRef idx="0">
+            <a:schemeClr val="accent1"/>
+          </a:effectRef>
+          <a:fontRef idx="minor">
+            <a:schemeClr val="tx1"/>
+          </a:fontRef>
+        </p:style>
+      </p:cxnSp>
+      <p:pic>
+        <p:nvPicPr>
+          <p:cNvPr id="1026" name="Picture 2" descr="Bilan - J'aime gérer">
+            <a:extLst>
+              <a:ext uri="{FF2B5EF4-FFF2-40B4-BE49-F238E27FC236}">
+                <a16:creationId xmlns:a16="http://schemas.microsoft.com/office/drawing/2014/main" id="{4F26AF23-4D6C-E72A-50DA-DEDDFFECA7F3}"/>
+              </a:ext>
+            </a:extLst>
+          </p:cNvPr>
+          <p:cNvPicPr>
+            <a:picLocks noChangeAspect="1" noChangeArrowheads="1"/>
+          </p:cNvPicPr>
+          <p:nvPr/>
+        </p:nvPicPr>
+        <p:blipFill>
+          <a:blip r:embed="rId2">
+            <a:extLst>
+              <a:ext uri="{28A0092B-C50C-407E-A947-70E740481C1C}">
+                <a14:useLocalDpi xmlns:a14="http://schemas.microsoft.com/office/drawing/2010/main" val="0"/>
+              </a:ext>
+            </a:extLst>
+          </a:blip>
+          <a:stretch>
+            <a:fillRect/>
+          </a:stretch>
+        </p:blipFill>
+        <p:spPr bwMode="auto">
+          <a:xfrm>
+            <a:off x="2514995" y="2427541"/>
+            <a:ext cx="7106910" cy="3997637"/>
+          </a:xfrm>
+          <a:prstGeom prst="rect">
+            <a:avLst/>
+          </a:prstGeom>
+          <a:noFill/>
+          <a:extLst>
+            <a:ext uri="{909E8E84-426E-40DD-AFC4-6F175D3DCCD1}">
+              <a14:hiddenFill xmlns:a14="http://schemas.microsoft.com/office/drawing/2010/main">
+                <a:solidFill>
+                  <a:srgbClr val="FFFFFF"/>
+                </a:solidFill>
+              </a14:hiddenFill>
+            </a:ext>
+          </a:extLst>
+        </p:spPr>
+      </p:pic>
     </p:spTree>
     <p:extLst>
       <p:ext uri="{BB962C8B-B14F-4D97-AF65-F5344CB8AC3E}">

</xml_diff>